<commit_message>
Added Lab 2 slides
</commit_message>
<xml_diff>
--- a/data8/slides/sp20_lab1.pptx
+++ b/data8/slides/sp20_lab1.pptx
@@ -210,7 +210,7 @@
           <a:p>
             <a:fld id="{97CB1905-1EEB-6545-B5E2-B70E8868255E}" type="datetimeFigureOut">
               <a:rPr lang="en-US" smtClean="0"/>
-              <a:t>1/23/2020</a:t>
+              <a:t>1/24/2020</a:t>
             </a:fld>
             <a:endParaRPr lang="en-US"/>
           </a:p>
@@ -376,7 +376,7 @@
           <a:p>
             <a:fld id="{5F53F6BF-7462-9046-A2B6-90C29244BD27}" type="datetimeFigureOut">
               <a:rPr lang="en-US" smtClean="0"/>
-              <a:t>1/23/2020</a:t>
+              <a:t>1/24/2020</a:t>
             </a:fld>
             <a:endParaRPr lang="en-US"/>
           </a:p>
@@ -8965,8 +8965,11 @@
               <a:rPr lang="en-CA" dirty="0" smtClean="0">
                 <a:latin typeface="Avenir LT Std 45 Book" pitchFamily="34" charset="0"/>
               </a:rPr>
-              <a:t>Every Weekday from 12-5pm</a:t>
-            </a:r>
+              <a:t>TBD</a:t>
+            </a:r>
+            <a:endParaRPr lang="en-CA" dirty="0" smtClean="0">
+              <a:latin typeface="Avenir LT Std 45 Book" pitchFamily="34" charset="0"/>
+            </a:endParaRPr>
           </a:p>
         </p:txBody>
       </p:sp>
@@ -9784,7 +9787,13 @@
               <a:rPr lang="en-CA" dirty="0" smtClean="0">
                 <a:latin typeface="Avenir LT Std 45 Book" pitchFamily="34" charset="0"/>
               </a:rPr>
-              <a:t>Form groups of 3-4 and find something all of you have in common!</a:t>
+              <a:t>Form one group for each table and </a:t>
+            </a:r>
+            <a:r>
+              <a:rPr lang="en-CA" dirty="0" smtClean="0">
+                <a:latin typeface="Avenir LT Std 45 Book" pitchFamily="34" charset="0"/>
+              </a:rPr>
+              <a:t>find something all of you have in common!</a:t>
             </a:r>
           </a:p>
           <a:p>
@@ -9803,7 +9812,19 @@
               <a:rPr lang="en-CA" dirty="0" smtClean="0">
                 <a:latin typeface="Avenir LT Std 45 Book" pitchFamily="34" charset="0"/>
               </a:rPr>
-              <a:t>Example: During a previous semester, a group of 4 all had a family relative with the same name!</a:t>
+              <a:t>Example: During a previous semester, </a:t>
+            </a:r>
+            <a:r>
+              <a:rPr lang="en-CA" smtClean="0">
+                <a:latin typeface="Avenir LT Std 45 Book" pitchFamily="34" charset="0"/>
+              </a:rPr>
+              <a:t>one table all </a:t>
+            </a:r>
+            <a:r>
+              <a:rPr lang="en-CA" dirty="0" smtClean="0">
+                <a:latin typeface="Avenir LT Std 45 Book" pitchFamily="34" charset="0"/>
+              </a:rPr>
+              <a:t>had a family relative with the same name!</a:t>
             </a:r>
             <a:endParaRPr lang="en-CA" dirty="0">
               <a:latin typeface="Avenir LT Std 45 Book" pitchFamily="34" charset="0"/>
@@ -9904,17 +9925,8 @@
               <a:rPr lang="en-CA" dirty="0" smtClean="0">
                 <a:latin typeface="Avenir LT Std 45 Book" pitchFamily="34" charset="0"/>
               </a:rPr>
-              <a:t>Introduce yourself to the people sitting around you and work </a:t>
-            </a:r>
-            <a:r>
-              <a:rPr lang="en-CA" dirty="0" smtClean="0">
-                <a:latin typeface="Avenir LT Std 45 Book" pitchFamily="34" charset="0"/>
-              </a:rPr>
-              <a:t>as a table</a:t>
-            </a:r>
-            <a:endParaRPr lang="en-CA" dirty="0" smtClean="0">
-              <a:latin typeface="Avenir LT Std 45 Book" pitchFamily="34" charset="0"/>
-            </a:endParaRPr>
+              <a:t>Introduce yourself to the people sitting around you and work as a table</a:t>
+            </a:r>
           </a:p>
           <a:p>
             <a:r>

</xml_diff>